<commit_message>
pspec figure with bif
</commit_message>
<xml_diff>
--- a/figures/fig_edits.pptx
+++ b/figures/fig_edits.pptx
@@ -5,12 +5,13 @@
     <p:sldMasterId id="2147483648" r:id="rId1"/>
   </p:sldMasterIdLst>
   <p:notesMasterIdLst>
-    <p:notesMasterId r:id="rId5"/>
+    <p:notesMasterId r:id="rId6"/>
   </p:notesMasterIdLst>
   <p:sldIdLst>
     <p:sldId id="256" r:id="rId2"/>
     <p:sldId id="258" r:id="rId3"/>
     <p:sldId id="259" r:id="rId4"/>
+    <p:sldId id="260" r:id="rId5"/>
   </p:sldIdLst>
   <p:sldSz cx="12192000" cy="6858000"/>
   <p:notesSz cx="6858000" cy="9144000"/>
@@ -199,7 +200,7 @@
           <a:p>
             <a:fld id="{58A0F72A-30D6-CA4A-8E92-AB606F3D8863}" type="datetimeFigureOut">
               <a:rPr lang="en-GB" smtClean="0"/>
-              <a:t>23/10/2018</a:t>
+              <a:t>12/12/2018</a:t>
             </a:fld>
             <a:endParaRPr lang="en-GB"/>
           </a:p>
@@ -784,7 +785,7 @@
           <a:p>
             <a:fld id="{C7987070-D0EE-D146-8314-C03A55E670EE}" type="datetimeFigureOut">
               <a:rPr lang="en-GB" smtClean="0"/>
-              <a:t>23/10/2018</a:t>
+              <a:t>12/12/2018</a:t>
             </a:fld>
             <a:endParaRPr lang="en-GB"/>
           </a:p>
@@ -984,7 +985,7 @@
           <a:p>
             <a:fld id="{C7987070-D0EE-D146-8314-C03A55E670EE}" type="datetimeFigureOut">
               <a:rPr lang="en-GB" smtClean="0"/>
-              <a:t>23/10/2018</a:t>
+              <a:t>12/12/2018</a:t>
             </a:fld>
             <a:endParaRPr lang="en-GB"/>
           </a:p>
@@ -1194,7 +1195,7 @@
           <a:p>
             <a:fld id="{C7987070-D0EE-D146-8314-C03A55E670EE}" type="datetimeFigureOut">
               <a:rPr lang="en-GB" smtClean="0"/>
-              <a:t>23/10/2018</a:t>
+              <a:t>12/12/2018</a:t>
             </a:fld>
             <a:endParaRPr lang="en-GB"/>
           </a:p>
@@ -1394,7 +1395,7 @@
           <a:p>
             <a:fld id="{C7987070-D0EE-D146-8314-C03A55E670EE}" type="datetimeFigureOut">
               <a:rPr lang="en-GB" smtClean="0"/>
-              <a:t>23/10/2018</a:t>
+              <a:t>12/12/2018</a:t>
             </a:fld>
             <a:endParaRPr lang="en-GB"/>
           </a:p>
@@ -1670,7 +1671,7 @@
           <a:p>
             <a:fld id="{C7987070-D0EE-D146-8314-C03A55E670EE}" type="datetimeFigureOut">
               <a:rPr lang="en-GB" smtClean="0"/>
-              <a:t>23/10/2018</a:t>
+              <a:t>12/12/2018</a:t>
             </a:fld>
             <a:endParaRPr lang="en-GB"/>
           </a:p>
@@ -1938,7 +1939,7 @@
           <a:p>
             <a:fld id="{C7987070-D0EE-D146-8314-C03A55E670EE}" type="datetimeFigureOut">
               <a:rPr lang="en-GB" smtClean="0"/>
-              <a:t>23/10/2018</a:t>
+              <a:t>12/12/2018</a:t>
             </a:fld>
             <a:endParaRPr lang="en-GB"/>
           </a:p>
@@ -2353,7 +2354,7 @@
           <a:p>
             <a:fld id="{C7987070-D0EE-D146-8314-C03A55E670EE}" type="datetimeFigureOut">
               <a:rPr lang="en-GB" smtClean="0"/>
-              <a:t>23/10/2018</a:t>
+              <a:t>12/12/2018</a:t>
             </a:fld>
             <a:endParaRPr lang="en-GB"/>
           </a:p>
@@ -2495,7 +2496,7 @@
           <a:p>
             <a:fld id="{C7987070-D0EE-D146-8314-C03A55E670EE}" type="datetimeFigureOut">
               <a:rPr lang="en-GB" smtClean="0"/>
-              <a:t>23/10/2018</a:t>
+              <a:t>12/12/2018</a:t>
             </a:fld>
             <a:endParaRPr lang="en-GB"/>
           </a:p>
@@ -2608,7 +2609,7 @@
           <a:p>
             <a:fld id="{C7987070-D0EE-D146-8314-C03A55E670EE}" type="datetimeFigureOut">
               <a:rPr lang="en-GB" smtClean="0"/>
-              <a:t>23/10/2018</a:t>
+              <a:t>12/12/2018</a:t>
             </a:fld>
             <a:endParaRPr lang="en-GB"/>
           </a:p>
@@ -2921,7 +2922,7 @@
           <a:p>
             <a:fld id="{C7987070-D0EE-D146-8314-C03A55E670EE}" type="datetimeFigureOut">
               <a:rPr lang="en-GB" smtClean="0"/>
-              <a:t>23/10/2018</a:t>
+              <a:t>12/12/2018</a:t>
             </a:fld>
             <a:endParaRPr lang="en-GB"/>
           </a:p>
@@ -3210,7 +3211,7 @@
           <a:p>
             <a:fld id="{C7987070-D0EE-D146-8314-C03A55E670EE}" type="datetimeFigureOut">
               <a:rPr lang="en-GB" smtClean="0"/>
-              <a:t>23/10/2018</a:t>
+              <a:t>12/12/2018</a:t>
             </a:fld>
             <a:endParaRPr lang="en-GB"/>
           </a:p>
@@ -3453,7 +3454,7 @@
           <a:p>
             <a:fld id="{C7987070-D0EE-D146-8314-C03A55E670EE}" type="datetimeFigureOut">
               <a:rPr lang="en-GB" smtClean="0"/>
-              <a:t>23/10/2018</a:t>
+              <a:t>12/12/2018</a:t>
             </a:fld>
             <a:endParaRPr lang="en-GB"/>
           </a:p>
@@ -4237,12 +4238,180 @@
           <a:chExt cx="0" cy="0"/>
         </a:xfrm>
       </p:grpSpPr>
+      <p:pic>
+        <p:nvPicPr>
+          <p:cNvPr id="5" name="Picture 4">
+            <a:extLst>
+              <a:ext uri="{FF2B5EF4-FFF2-40B4-BE49-F238E27FC236}">
+                <a16:creationId xmlns:a16="http://schemas.microsoft.com/office/drawing/2014/main" id="{24FBC3B2-766C-6F4E-B022-1A43850E59EF}"/>
+              </a:ext>
+            </a:extLst>
+          </p:cNvPr>
+          <p:cNvPicPr>
+            <a:picLocks noChangeAspect="1"/>
+          </p:cNvPicPr>
+          <p:nvPr/>
+        </p:nvPicPr>
+        <p:blipFill>
+          <a:blip r:embed="rId2"/>
+          <a:stretch>
+            <a:fillRect/>
+          </a:stretch>
+        </p:blipFill>
+        <p:spPr>
+          <a:xfrm>
+            <a:off x="3634740" y="182880"/>
+            <a:ext cx="3978000" cy="6281053"/>
+          </a:xfrm>
+          <a:prstGeom prst="rect">
+            <a:avLst/>
+          </a:prstGeom>
+        </p:spPr>
+      </p:pic>
+      <p:sp>
+        <p:nvSpPr>
+          <p:cNvPr id="6" name="Rectangle 5">
+            <a:extLst>
+              <a:ext uri="{FF2B5EF4-FFF2-40B4-BE49-F238E27FC236}">
+                <a16:creationId xmlns:a16="http://schemas.microsoft.com/office/drawing/2014/main" id="{27C3A2C0-553B-9B45-ABCA-4EE0243ABF7B}"/>
+              </a:ext>
+            </a:extLst>
+          </p:cNvPr>
+          <p:cNvSpPr/>
+          <p:nvPr/>
+        </p:nvSpPr>
+        <p:spPr>
+          <a:xfrm>
+            <a:off x="4831448" y="385463"/>
+            <a:ext cx="592393" cy="5628640"/>
+          </a:xfrm>
+          <a:prstGeom prst="rect">
+            <a:avLst/>
+          </a:prstGeom>
+          <a:solidFill>
+            <a:schemeClr val="tx1">
+              <a:alpha val="6000"/>
+            </a:schemeClr>
+          </a:solidFill>
+          <a:ln w="6350">
+            <a:noFill/>
+          </a:ln>
+        </p:spPr>
+        <p:style>
+          <a:lnRef idx="2">
+            <a:schemeClr val="accent1">
+              <a:shade val="50000"/>
+            </a:schemeClr>
+          </a:lnRef>
+          <a:fillRef idx="1">
+            <a:schemeClr val="accent1"/>
+          </a:fillRef>
+          <a:effectRef idx="0">
+            <a:schemeClr val="accent1"/>
+          </a:effectRef>
+          <a:fontRef idx="minor">
+            <a:schemeClr val="lt1"/>
+          </a:fontRef>
+        </p:style>
+        <p:txBody>
+          <a:bodyPr rtlCol="0" anchor="ctr"/>
+          <a:lstStyle/>
+          <a:p>
+            <a:pPr algn="ctr"/>
+            <a:endParaRPr lang="en-GB" dirty="0"/>
+          </a:p>
+        </p:txBody>
+      </p:sp>
+      <p:sp>
+        <p:nvSpPr>
+          <p:cNvPr id="7" name="Rectangle 6">
+            <a:extLst>
+              <a:ext uri="{FF2B5EF4-FFF2-40B4-BE49-F238E27FC236}">
+                <a16:creationId xmlns:a16="http://schemas.microsoft.com/office/drawing/2014/main" id="{EF4E3DB6-49E2-7043-A743-ABE6F1CF982C}"/>
+              </a:ext>
+            </a:extLst>
+          </p:cNvPr>
+          <p:cNvSpPr/>
+          <p:nvPr/>
+        </p:nvSpPr>
+        <p:spPr>
+          <a:xfrm>
+            <a:off x="6360127" y="385463"/>
+            <a:ext cx="74879" cy="5628640"/>
+          </a:xfrm>
+          <a:prstGeom prst="rect">
+            <a:avLst/>
+          </a:prstGeom>
+          <a:solidFill>
+            <a:schemeClr val="tx1">
+              <a:alpha val="6000"/>
+            </a:schemeClr>
+          </a:solidFill>
+          <a:ln w="6350">
+            <a:noFill/>
+          </a:ln>
+        </p:spPr>
+        <p:style>
+          <a:lnRef idx="2">
+            <a:schemeClr val="accent1">
+              <a:shade val="50000"/>
+            </a:schemeClr>
+          </a:lnRef>
+          <a:fillRef idx="1">
+            <a:schemeClr val="accent1"/>
+          </a:fillRef>
+          <a:effectRef idx="0">
+            <a:schemeClr val="accent1"/>
+          </a:effectRef>
+          <a:fontRef idx="minor">
+            <a:schemeClr val="lt1"/>
+          </a:fontRef>
+        </p:style>
+        <p:txBody>
+          <a:bodyPr rtlCol="0" anchor="ctr"/>
+          <a:lstStyle/>
+          <a:p>
+            <a:pPr algn="ctr"/>
+            <a:endParaRPr lang="en-GB" dirty="0"/>
+          </a:p>
+        </p:txBody>
+      </p:sp>
+    </p:spTree>
+    <p:extLst>
+      <p:ext uri="{BB962C8B-B14F-4D97-AF65-F5344CB8AC3E}">
+        <p14:creationId xmlns:p14="http://schemas.microsoft.com/office/powerpoint/2010/main" val="3869939528"/>
+      </p:ext>
+    </p:extLst>
+  </p:cSld>
+  <p:clrMapOvr>
+    <a:masterClrMapping/>
+  </p:clrMapOvr>
+</p:sld>
+</file>
+
+<file path=ppt/slides/slide4.xml><?xml version="1.0" encoding="utf-8"?>
+<p:sld xmlns:a="http://schemas.openxmlformats.org/drawingml/2006/main" xmlns:r="http://schemas.openxmlformats.org/officeDocument/2006/relationships" xmlns:p="http://schemas.openxmlformats.org/presentationml/2006/main">
+  <p:cSld>
+    <p:spTree>
+      <p:nvGrpSpPr>
+        <p:cNvPr id="1" name=""/>
+        <p:cNvGrpSpPr/>
+        <p:nvPr/>
+      </p:nvGrpSpPr>
+      <p:grpSpPr>
+        <a:xfrm>
+          <a:off x="0" y="0"/>
+          <a:ext cx="0" cy="0"/>
+          <a:chOff x="0" y="0"/>
+          <a:chExt cx="0" cy="0"/>
+        </a:xfrm>
+      </p:grpSpPr>
       <p:grpSp>
         <p:nvGrpSpPr>
           <p:cNvPr id="8" name="Group 7">
             <a:extLst>
               <a:ext uri="{FF2B5EF4-FFF2-40B4-BE49-F238E27FC236}">
-                <a16:creationId xmlns:a16="http://schemas.microsoft.com/office/drawing/2014/main" id="{386B9795-F277-B143-996B-FC1EE084D591}"/>
+                <a16:creationId xmlns:a16="http://schemas.microsoft.com/office/drawing/2014/main" id="{E340C771-8021-3542-9527-E4705260B256}"/>
               </a:ext>
             </a:extLst>
           </p:cNvPr>
@@ -4251,9 +4420,9 @@
         </p:nvGrpSpPr>
         <p:grpSpPr>
           <a:xfrm>
-            <a:off x="3924300" y="1"/>
+            <a:off x="2512594" y="256674"/>
             <a:ext cx="3978000" cy="6281053"/>
-            <a:chOff x="3924300" y="1"/>
+            <a:chOff x="3924300" y="240632"/>
             <a:chExt cx="3978000" cy="6281053"/>
           </a:xfrm>
         </p:grpSpPr>
@@ -4262,7 +4431,7 @@
             <p:cNvPr id="5" name="Picture 4">
               <a:extLst>
                 <a:ext uri="{FF2B5EF4-FFF2-40B4-BE49-F238E27FC236}">
-                  <a16:creationId xmlns:a16="http://schemas.microsoft.com/office/drawing/2014/main" id="{24FBC3B2-766C-6F4E-B022-1A43850E59EF}"/>
+                  <a16:creationId xmlns:a16="http://schemas.microsoft.com/office/drawing/2014/main" id="{33509D44-5B6A-5A42-9277-5879B5724B46}"/>
                 </a:ext>
               </a:extLst>
             </p:cNvPr>
@@ -4279,7 +4448,7 @@
           </p:blipFill>
           <p:spPr>
             <a:xfrm>
-              <a:off x="3924300" y="1"/>
+              <a:off x="3924300" y="240632"/>
               <a:ext cx="3978000" cy="6281053"/>
             </a:xfrm>
             <a:prstGeom prst="rect">
@@ -4292,7 +4461,7 @@
             <p:cNvPr id="6" name="Rectangle 5">
               <a:extLst>
                 <a:ext uri="{FF2B5EF4-FFF2-40B4-BE49-F238E27FC236}">
-                  <a16:creationId xmlns:a16="http://schemas.microsoft.com/office/drawing/2014/main" id="{27C3A2C0-553B-9B45-ABCA-4EE0243ABF7B}"/>
+                  <a16:creationId xmlns:a16="http://schemas.microsoft.com/office/drawing/2014/main" id="{A75D240C-64F6-2D4F-BBF7-6C202A9ABD31}"/>
                 </a:ext>
               </a:extLst>
             </p:cNvPr>
@@ -4301,7 +4470,7 @@
           </p:nvSpPr>
           <p:spPr>
             <a:xfrm>
-              <a:off x="5121008" y="202584"/>
+              <a:off x="5136248" y="433589"/>
               <a:ext cx="592393" cy="5628640"/>
             </a:xfrm>
             <a:prstGeom prst="rect">
@@ -4346,7 +4515,7 @@
             <p:cNvPr id="7" name="Rectangle 6">
               <a:extLst>
                 <a:ext uri="{FF2B5EF4-FFF2-40B4-BE49-F238E27FC236}">
-                  <a16:creationId xmlns:a16="http://schemas.microsoft.com/office/drawing/2014/main" id="{EF4E3DB6-49E2-7043-A743-ABE6F1CF982C}"/>
+                  <a16:creationId xmlns:a16="http://schemas.microsoft.com/office/drawing/2014/main" id="{1D9473E8-054E-3142-949C-5A96834F2E30}"/>
                 </a:ext>
               </a:extLst>
             </p:cNvPr>
@@ -4355,7 +4524,7 @@
           </p:nvSpPr>
           <p:spPr>
             <a:xfrm>
-              <a:off x="6649687" y="202584"/>
+              <a:off x="6664927" y="433589"/>
               <a:ext cx="74879" cy="5628640"/>
             </a:xfrm>
             <a:prstGeom prst="rect">
@@ -4399,7 +4568,7 @@
     </p:spTree>
     <p:extLst>
       <p:ext uri="{BB962C8B-B14F-4D97-AF65-F5344CB8AC3E}">
-        <p14:creationId xmlns:p14="http://schemas.microsoft.com/office/powerpoint/2010/main" val="3869939528"/>
+        <p14:creationId xmlns:p14="http://schemas.microsoft.com/office/powerpoint/2010/main" val="3890898450"/>
       </p:ext>
     </p:extLst>
   </p:cSld>

</xml_diff>